<commit_message>
Poster update + added feature importance
</commit_message>
<xml_diff>
--- a/ML_Poster_v3.pptx
+++ b/ML_Poster_v3.pptx
@@ -254,7 +254,7 @@
           <a:p>
             <a:fld id="{AFD5325B-1A15-4464-AC58-4D5851FBB6B7}" type="datetimeFigureOut">
               <a:rPr lang="en-CH" smtClean="0"/>
-              <a:t>28/11/2021</a:t>
+              <a:t>11/29/2021</a:t>
             </a:fld>
             <a:endParaRPr lang="en-CH"/>
           </a:p>
@@ -424,7 +424,7 @@
           <a:p>
             <a:fld id="{AFD5325B-1A15-4464-AC58-4D5851FBB6B7}" type="datetimeFigureOut">
               <a:rPr lang="en-CH" smtClean="0"/>
-              <a:t>28/11/2021</a:t>
+              <a:t>11/29/2021</a:t>
             </a:fld>
             <a:endParaRPr lang="en-CH"/>
           </a:p>
@@ -604,7 +604,7 @@
           <a:p>
             <a:fld id="{AFD5325B-1A15-4464-AC58-4D5851FBB6B7}" type="datetimeFigureOut">
               <a:rPr lang="en-CH" smtClean="0"/>
-              <a:t>28/11/2021</a:t>
+              <a:t>11/29/2021</a:t>
             </a:fld>
             <a:endParaRPr lang="en-CH"/>
           </a:p>
@@ -699,7 +699,7 @@
           <a:p>
             <a:fld id="{AFD5325B-1A15-4464-AC58-4D5851FBB6B7}" type="datetimeFigureOut">
               <a:rPr lang="en-CH" smtClean="0"/>
-              <a:t>28/11/2021</a:t>
+              <a:t>11/29/2021</a:t>
             </a:fld>
             <a:endParaRPr lang="en-CH"/>
           </a:p>
@@ -869,7 +869,7 @@
           <a:p>
             <a:fld id="{AFD5325B-1A15-4464-AC58-4D5851FBB6B7}" type="datetimeFigureOut">
               <a:rPr lang="en-CH" smtClean="0"/>
-              <a:t>28/11/2021</a:t>
+              <a:t>11/29/2021</a:t>
             </a:fld>
             <a:endParaRPr lang="en-CH"/>
           </a:p>
@@ -1113,7 +1113,7 @@
           <a:p>
             <a:fld id="{AFD5325B-1A15-4464-AC58-4D5851FBB6B7}" type="datetimeFigureOut">
               <a:rPr lang="en-CH" smtClean="0"/>
-              <a:t>28/11/2021</a:t>
+              <a:t>11/29/2021</a:t>
             </a:fld>
             <a:endParaRPr lang="en-CH"/>
           </a:p>
@@ -1345,7 +1345,7 @@
           <a:p>
             <a:fld id="{AFD5325B-1A15-4464-AC58-4D5851FBB6B7}" type="datetimeFigureOut">
               <a:rPr lang="en-CH" smtClean="0"/>
-              <a:t>28/11/2021</a:t>
+              <a:t>11/29/2021</a:t>
             </a:fld>
             <a:endParaRPr lang="en-CH"/>
           </a:p>
@@ -1712,7 +1712,7 @@
           <a:p>
             <a:fld id="{AFD5325B-1A15-4464-AC58-4D5851FBB6B7}" type="datetimeFigureOut">
               <a:rPr lang="en-CH" smtClean="0"/>
-              <a:t>28/11/2021</a:t>
+              <a:t>11/29/2021</a:t>
             </a:fld>
             <a:endParaRPr lang="en-CH"/>
           </a:p>
@@ -1830,7 +1830,7 @@
           <a:p>
             <a:fld id="{AFD5325B-1A15-4464-AC58-4D5851FBB6B7}" type="datetimeFigureOut">
               <a:rPr lang="en-CH" smtClean="0"/>
-              <a:t>28/11/2021</a:t>
+              <a:t>11/29/2021</a:t>
             </a:fld>
             <a:endParaRPr lang="en-CH"/>
           </a:p>
@@ -1925,7 +1925,7 @@
           <a:p>
             <a:fld id="{AFD5325B-1A15-4464-AC58-4D5851FBB6B7}" type="datetimeFigureOut">
               <a:rPr lang="en-CH" smtClean="0"/>
-              <a:t>28/11/2021</a:t>
+              <a:t>11/29/2021</a:t>
             </a:fld>
             <a:endParaRPr lang="en-CH"/>
           </a:p>
@@ -2202,7 +2202,7 @@
           <a:p>
             <a:fld id="{AFD5325B-1A15-4464-AC58-4D5851FBB6B7}" type="datetimeFigureOut">
               <a:rPr lang="en-CH" smtClean="0"/>
-              <a:t>28/11/2021</a:t>
+              <a:t>11/29/2021</a:t>
             </a:fld>
             <a:endParaRPr lang="en-CH"/>
           </a:p>
@@ -2459,7 +2459,7 @@
           <a:p>
             <a:fld id="{AFD5325B-1A15-4464-AC58-4D5851FBB6B7}" type="datetimeFigureOut">
               <a:rPr lang="en-CH" smtClean="0"/>
-              <a:t>28/11/2021</a:t>
+              <a:t>11/29/2021</a:t>
             </a:fld>
             <a:endParaRPr lang="en-CH"/>
           </a:p>
@@ -2672,7 +2672,7 @@
           <a:p>
             <a:fld id="{AFD5325B-1A15-4464-AC58-4D5851FBB6B7}" type="datetimeFigureOut">
               <a:rPr lang="en-CH" smtClean="0"/>
-              <a:t>28/11/2021</a:t>
+              <a:t>11/29/2021</a:t>
             </a:fld>
             <a:endParaRPr lang="en-CH"/>
           </a:p>
@@ -3197,8 +3197,8 @@
         </p:nvSpPr>
         <p:spPr>
           <a:xfrm>
-            <a:off x="171450" y="2507967"/>
-            <a:ext cx="21004894" cy="5734669"/>
+            <a:off x="171450" y="2507968"/>
+            <a:ext cx="21004894" cy="5752112"/>
           </a:xfrm>
           <a:prstGeom prst="rect">
             <a:avLst/>
@@ -3555,7 +3555,7 @@
                 </a:solidFill>
                 <a:latin typeface="NexusSerif"/>
               </a:rPr>
-              <a:t>For easier visual representation the categorical </a:t>
+              <a:t>For easier visual representation, the categorical </a:t>
             </a:r>
             <a:br>
               <a:rPr lang="en-GB" sz="1600" dirty="0">
@@ -3770,7 +3770,7 @@
         </p:nvGrpSpPr>
         <p:grpSpPr>
           <a:xfrm>
-            <a:off x="171450" y="8225109"/>
+            <a:off x="171450" y="8263209"/>
             <a:ext cx="21040725" cy="3750510"/>
             <a:chOff x="171450" y="9720308"/>
             <a:chExt cx="21040725" cy="3134716"/>
@@ -3838,7 +3838,7 @@
               <a:p>
                 <a:r>
                   <a:rPr lang="en-US" b="1" dirty="0"/>
-                  <a:t>3) Model description - Decision Tree (DT)</a:t>
+                  <a:t>3) a) Model description - Decision Tree (DT)</a:t>
                 </a:r>
               </a:p>
               <a:p>
@@ -3935,7 +3935,7 @@
               <a:p>
                 <a:r>
                   <a:rPr lang="en-US" b="1" dirty="0"/>
-                  <a:t>3) Model description (cont.) - K-Nearest Neighbors (KNN)</a:t>
+                  <a:t>3) b) Model description - K-Nearest Neighbors (KNN)</a:t>
                 </a:r>
               </a:p>
               <a:p>
@@ -4310,7 +4310,7 @@
         <p:spPr>
           <a:xfrm>
             <a:off x="10716586" y="26842024"/>
-            <a:ext cx="10454546" cy="3139321"/>
+            <a:ext cx="10454546" cy="3508653"/>
           </a:xfrm>
           <a:prstGeom prst="rect">
             <a:avLst/>
@@ -4527,7 +4527,7 @@
           <a:p>
             <a:r>
               <a:rPr lang="en-US" sz="1200" dirty="0"/>
-              <a:t>[6] Friedman, J. H. (2017). The elements of statistical learning: Data mining, inference, and prediction. springer open.</a:t>
+              <a:t>[6] Friedman, J. H. (2017). The elements of statistical learning: Data mining, inference, and prediction. </a:t>
             </a:r>
           </a:p>
           <a:p>
@@ -4540,6 +4540,60 @@
             <a:r>
               <a:rPr lang="en-US" sz="1200" dirty="0"/>
               <a:t>[8] Sun, J., Du, W., &amp; Shi,  N. (2018).  A  Survey  of  KNN  Algorithm. Information  Engineering  and Applied Computing. doi:10.18063/ieac.v1i1.770</a:t>
+            </a:r>
+          </a:p>
+          <a:p>
+            <a:r>
+              <a:rPr lang="en-US" sz="1200" dirty="0"/>
+              <a:t>[9] Abu </a:t>
+            </a:r>
+            <a:r>
+              <a:rPr lang="en-US" sz="1200" dirty="0" err="1"/>
+              <a:t>Alfeilat</a:t>
+            </a:r>
+            <a:r>
+              <a:rPr lang="en-US" sz="1200" dirty="0"/>
+              <a:t>, H. A., </a:t>
+            </a:r>
+            <a:r>
+              <a:rPr lang="en-US" sz="1200" dirty="0" err="1"/>
+              <a:t>Hassanat</a:t>
+            </a:r>
+            <a:r>
+              <a:rPr lang="en-US" sz="1200" dirty="0"/>
+              <a:t>, A. B., </a:t>
+            </a:r>
+            <a:r>
+              <a:rPr lang="en-US" sz="1200" dirty="0" err="1"/>
+              <a:t>Lasassmeh</a:t>
+            </a:r>
+            <a:r>
+              <a:rPr lang="en-US" sz="1200" dirty="0"/>
+              <a:t>, O., </a:t>
+            </a:r>
+            <a:r>
+              <a:rPr lang="en-US" sz="1200" dirty="0" err="1"/>
+              <a:t>Tarawneh</a:t>
+            </a:r>
+            <a:r>
+              <a:rPr lang="en-US" sz="1200" dirty="0"/>
+              <a:t>, A. S., </a:t>
+            </a:r>
+            <a:r>
+              <a:rPr lang="en-US" sz="1200" dirty="0" err="1"/>
+              <a:t>Alhasanat</a:t>
+            </a:r>
+            <a:r>
+              <a:rPr lang="en-US" sz="1200" dirty="0"/>
+              <a:t>, M. B., </a:t>
+            </a:r>
+            <a:r>
+              <a:rPr lang="en-US" sz="1200" dirty="0" err="1"/>
+              <a:t>Eyal</a:t>
+            </a:r>
+            <a:r>
+              <a:rPr lang="en-US" sz="1200" dirty="0"/>
+              <a:t> Salman, H. S., &amp; Prasath, V. S. (2019). Effects of distance measure choice on k-nearest neighbor classifier performance: a review. Big data, 7(4), 221-248.</a:t>
             </a:r>
           </a:p>
         </p:txBody>
@@ -4558,7 +4612,7 @@
         </p:nvSpPr>
         <p:spPr>
           <a:xfrm>
-            <a:off x="173626" y="11953514"/>
+            <a:off x="173626" y="11991614"/>
             <a:ext cx="10518188" cy="2810236"/>
           </a:xfrm>
           <a:prstGeom prst="rect">
@@ -4613,7 +4667,7 @@
             </a:br>
             <a:r>
               <a:rPr lang="en-US" sz="1600" dirty="0"/>
-              <a:t>These are a 33.1% false positive rate, a 19.1% false negative rate, 71.6% accuracy, 32.6% specificity, and 67.4% sensitivity.</a:t>
+              <a:t>These are a 71.6% accuracy, 32.6% specificity, and 67.4% sensitivity/recall.</a:t>
             </a:r>
           </a:p>
           <a:p>
@@ -4893,7 +4947,7 @@
         </p:nvSpPr>
         <p:spPr>
           <a:xfrm>
-            <a:off x="10690001" y="11953514"/>
+            <a:off x="10690001" y="11991614"/>
             <a:ext cx="10520363" cy="2810236"/>
           </a:xfrm>
           <a:prstGeom prst="rect">
@@ -4961,7 +5015,7 @@
             </a:pPr>
             <a:r>
               <a:rPr lang="en-US" sz="1600" dirty="0"/>
-              <a:t>Additionally, the effect of using F1-score instead of accuracy as the cross validation loss function is tested for each approach. Thus, six models were trained in total.</a:t>
+              <a:t>Additionally, the effect of using F1-score instead of accuracy as the cross-validation loss function is tested for each approach. Thus, six models were trained in total.</a:t>
             </a:r>
           </a:p>
           <a:p>
@@ -4981,40 +5035,8 @@
             </a:pPr>
             <a:r>
               <a:rPr lang="en-US" sz="1600" dirty="0"/>
-              <a:t>Each model is then evaluated by it’s ability to predict the observations in the test set, based on false positive and false negative rates, as well as accuracy, specificity, and sensitivity.</a:t>
-            </a:r>
-          </a:p>
-          <a:p>
-            <a:pPr lvl="1"/>
-            <a:endParaRPr lang="en-US" sz="1600" dirty="0"/>
-          </a:p>
-          <a:p>
-            <a:pPr marL="800100" lvl="1" indent="-342900">
-              <a:buFont typeface="+mj-lt"/>
-              <a:buAutoNum type="arabicPeriod"/>
-            </a:pPr>
-            <a:endParaRPr lang="en-US" sz="1600" dirty="0"/>
-          </a:p>
-          <a:p>
-            <a:pPr marL="800100" lvl="1" indent="-342900">
-              <a:buFont typeface="+mj-lt"/>
-              <a:buAutoNum type="arabicPeriod"/>
-            </a:pPr>
-            <a:endParaRPr lang="en-US" sz="1600" dirty="0"/>
-          </a:p>
-          <a:p>
-            <a:pPr marL="342900" indent="-342900">
-              <a:buFont typeface="Arial" panose="020B0604020202020204" pitchFamily="34" charset="0"/>
-              <a:buChar char="•"/>
-            </a:pPr>
-            <a:endParaRPr lang="en-US" sz="1600" dirty="0"/>
-          </a:p>
-          <a:p>
-            <a:pPr marL="342900" indent="-342900">
-              <a:buFont typeface="Arial" panose="020B0604020202020204" pitchFamily="34" charset="0"/>
-              <a:buChar char="•"/>
-            </a:pPr>
-            <a:endParaRPr lang="en-US" sz="1600" dirty="0"/>
+              <a:t>Each model is then evaluated by its ability to predict the observations in the test set, based on false positive and false negative rates, as well as accuracy, specificity, and sensitivity.</a:t>
+            </a:r>
           </a:p>
         </p:txBody>
       </p:sp>
@@ -5861,6 +5883,1017 @@
           </a:p>
         </p:txBody>
       </p:sp>
+      <p:sp>
+        <p:nvSpPr>
+          <p:cNvPr id="45" name="Rectangle 44">
+            <a:extLst>
+              <a:ext uri="{FF2B5EF4-FFF2-40B4-BE49-F238E27FC236}">
+                <a16:creationId xmlns:a16="http://schemas.microsoft.com/office/drawing/2014/main" id="{5BC59031-FDA2-477F-A2F7-83D6A9D62AFD}"/>
+              </a:ext>
+            </a:extLst>
+          </p:cNvPr>
+          <p:cNvSpPr/>
+          <p:nvPr/>
+        </p:nvSpPr>
+        <p:spPr>
+          <a:xfrm>
+            <a:off x="173626" y="14790735"/>
+            <a:ext cx="10518188" cy="5219022"/>
+          </a:xfrm>
+          <a:prstGeom prst="rect">
+            <a:avLst/>
+          </a:prstGeom>
+          <a:ln w="38100"/>
+        </p:spPr>
+        <p:style>
+          <a:lnRef idx="2">
+            <a:schemeClr val="dk1"/>
+          </a:lnRef>
+          <a:fillRef idx="1">
+            <a:schemeClr val="lt1"/>
+          </a:fillRef>
+          <a:effectRef idx="0">
+            <a:schemeClr val="dk1"/>
+          </a:effectRef>
+          <a:fontRef idx="minor">
+            <a:schemeClr val="dk1"/>
+          </a:fontRef>
+        </p:style>
+        <p:txBody>
+          <a:bodyPr rtlCol="0" anchor="t"/>
+          <a:lstStyle/>
+          <a:p>
+            <a:r>
+              <a:rPr lang="en-US" sz="2000" b="1" dirty="0"/>
+              <a:t>6) a) Choice of Parameters and Experimental Results – Decision Tree</a:t>
+            </a:r>
+          </a:p>
+          <a:p>
+            <a:pPr marL="342900" indent="-342900">
+              <a:buFont typeface="Arial" panose="020B0604020202020204" pitchFamily="34" charset="0"/>
+              <a:buChar char="•"/>
+            </a:pPr>
+            <a:r>
+              <a:rPr lang="en-US" sz="1600" dirty="0"/>
+              <a:t>To prevent overfitting to stopping criterions, i.e., the maximum number of splits and minimum size of leaf nodes, were tuned in a range of 1-30, which limit the depth of the final tree.</a:t>
+            </a:r>
+          </a:p>
+          <a:p>
+            <a:pPr marL="342900" indent="-342900">
+              <a:buFont typeface="Arial" panose="020B0604020202020204" pitchFamily="34" charset="0"/>
+              <a:buChar char="•"/>
+            </a:pPr>
+            <a:r>
+              <a:rPr lang="en-US" sz="1600" dirty="0"/>
+              <a:t>To help deal with the highly imbalanced data, the effects of implementing stratified cross-validation and SMOTE oversampling, as well as choosing F1-score instead of accuracy as the cross-validation loss function were tested.</a:t>
+            </a:r>
+          </a:p>
+          <a:p>
+            <a:endParaRPr lang="en-US" sz="1600" dirty="0"/>
+          </a:p>
+          <a:p>
+            <a:r>
+              <a:rPr lang="en-US" b="1" dirty="0"/>
+              <a:t>Results</a:t>
+            </a:r>
+            <a:r>
+              <a:rPr lang="en-US" dirty="0"/>
+              <a:t>:</a:t>
+            </a:r>
+          </a:p>
+          <a:p>
+            <a:pPr marL="285750" indent="-285750">
+              <a:buFont typeface="Arial" panose="020B0604020202020204" pitchFamily="34" charset="0"/>
+              <a:buChar char="•"/>
+            </a:pPr>
+            <a:r>
+              <a:rPr lang="en-US" sz="1600" dirty="0"/>
+              <a:t>SMOTE was the only preprocessing method that led to non-zero recall, i.e., at least one correct stroke classification.</a:t>
+            </a:r>
+          </a:p>
+          <a:p>
+            <a:pPr marL="285750" indent="-285750">
+              <a:buFont typeface="Arial" panose="020B0604020202020204" pitchFamily="34" charset="0"/>
+              <a:buChar char="•"/>
+            </a:pPr>
+            <a:r>
+              <a:rPr lang="en-US" sz="1600" dirty="0"/>
+              <a:t>Using F1 instead of accuracy had a </a:t>
+            </a:r>
+            <a:r>
+              <a:rPr lang="en-US" sz="1600" dirty="0">
+                <a:highlight>
+                  <a:srgbClr val="FFFF00"/>
+                </a:highlight>
+              </a:rPr>
+              <a:t>negligible</a:t>
+            </a:r>
+            <a:r>
+              <a:rPr lang="en-US" sz="1600" dirty="0"/>
+              <a:t> effect on evaluation metrics. </a:t>
+            </a:r>
+          </a:p>
+          <a:p>
+            <a:pPr marL="285750" indent="-285750">
+              <a:buFont typeface="Arial" panose="020B0604020202020204" pitchFamily="34" charset="0"/>
+              <a:buChar char="•"/>
+            </a:pPr>
+            <a:r>
+              <a:rPr lang="en-US" sz="1600" dirty="0"/>
+              <a:t>The final parameters from Bayesian optimization are </a:t>
+            </a:r>
+            <a:r>
+              <a:rPr lang="en-US" sz="1600" dirty="0">
+                <a:highlight>
+                  <a:srgbClr val="FFFF00"/>
+                </a:highlight>
+              </a:rPr>
+              <a:t>X</a:t>
+            </a:r>
+            <a:r>
+              <a:rPr lang="en-US" sz="1600" dirty="0"/>
+              <a:t> maximum splits and </a:t>
+            </a:r>
+            <a:r>
+              <a:rPr lang="en-US" sz="1600" dirty="0">
+                <a:highlight>
+                  <a:srgbClr val="FFFF00"/>
+                </a:highlight>
+              </a:rPr>
+              <a:t>X</a:t>
+            </a:r>
+            <a:r>
+              <a:rPr lang="en-US" sz="1600" dirty="0"/>
+              <a:t> minimum observations per leaf.</a:t>
+            </a:r>
+          </a:p>
+          <a:p>
+            <a:endParaRPr lang="en-US" sz="1600" dirty="0"/>
+          </a:p>
+          <a:p>
+            <a:pPr marL="342900" indent="-342900">
+              <a:buFont typeface="Arial" panose="020B0604020202020204" pitchFamily="34" charset="0"/>
+              <a:buChar char="•"/>
+            </a:pPr>
+            <a:endParaRPr lang="en-US" sz="1600" dirty="0"/>
+          </a:p>
+        </p:txBody>
+      </p:sp>
+      <p:sp>
+        <p:nvSpPr>
+          <p:cNvPr id="46" name="Rectangle 45">
+            <a:extLst>
+              <a:ext uri="{FF2B5EF4-FFF2-40B4-BE49-F238E27FC236}">
+                <a16:creationId xmlns:a16="http://schemas.microsoft.com/office/drawing/2014/main" id="{D3414485-1EF1-4CDF-B72C-F877C7986729}"/>
+              </a:ext>
+            </a:extLst>
+          </p:cNvPr>
+          <p:cNvSpPr/>
+          <p:nvPr/>
+        </p:nvSpPr>
+        <p:spPr>
+          <a:xfrm>
+            <a:off x="10690001" y="14790734"/>
+            <a:ext cx="10520363" cy="5219022"/>
+          </a:xfrm>
+          <a:prstGeom prst="rect">
+            <a:avLst/>
+          </a:prstGeom>
+          <a:ln w="38100"/>
+        </p:spPr>
+        <p:style>
+          <a:lnRef idx="2">
+            <a:schemeClr val="dk1"/>
+          </a:lnRef>
+          <a:fillRef idx="1">
+            <a:schemeClr val="lt1"/>
+          </a:fillRef>
+          <a:effectRef idx="0">
+            <a:schemeClr val="dk1"/>
+          </a:effectRef>
+          <a:fontRef idx="minor">
+            <a:schemeClr val="dk1"/>
+          </a:fontRef>
+        </p:style>
+        <p:txBody>
+          <a:bodyPr rtlCol="0" anchor="t"/>
+          <a:lstStyle/>
+          <a:p>
+            <a:r>
+              <a:rPr lang="en-US" sz="2000" b="1" dirty="0"/>
+              <a:t>6) b) Choice of Parameters and Experimental Results – K-Nearest Neighbors</a:t>
+            </a:r>
+          </a:p>
+          <a:p>
+            <a:pPr marL="285750" indent="-285750">
+              <a:buFont typeface="Arial" panose="020B0604020202020204" pitchFamily="34" charset="0"/>
+              <a:buChar char="•"/>
+            </a:pPr>
+            <a:r>
+              <a:rPr lang="en-US" sz="1600" dirty="0"/>
+              <a:t>The main hyperparameter, number of neighbors, was tuned in the range of 1-16, as 16 is the number of features in the data and thus constitutes the upper bound. Additionally, three different distance measures, i.e., ‘Euclidean distance’, ‘cosine similarity’ and ‘correlation’, were tested, as they belong to three different categories of distance measures [9].</a:t>
+            </a:r>
+          </a:p>
+          <a:p>
+            <a:pPr marL="285750" indent="-285750">
+              <a:buFont typeface="Arial" panose="020B0604020202020204" pitchFamily="34" charset="0"/>
+              <a:buChar char="•"/>
+            </a:pPr>
+            <a:r>
+              <a:rPr lang="en-US" sz="1600" dirty="0"/>
+              <a:t>Just like for the DT, SMOTE, stratified cross validation and F1 cross-validation loss were tested to address class imbalance.</a:t>
+            </a:r>
+          </a:p>
+          <a:p>
+            <a:endParaRPr lang="en-US" sz="1600" dirty="0"/>
+          </a:p>
+          <a:p>
+            <a:r>
+              <a:rPr lang="en-US" b="1" dirty="0"/>
+              <a:t>Results</a:t>
+            </a:r>
+            <a:r>
+              <a:rPr lang="en-US" dirty="0"/>
+              <a:t>:</a:t>
+            </a:r>
+          </a:p>
+          <a:p>
+            <a:pPr marL="285750" indent="-285750">
+              <a:buFont typeface="Arial" panose="020B0604020202020204" pitchFamily="34" charset="0"/>
+              <a:buChar char="•"/>
+            </a:pPr>
+            <a:r>
+              <a:rPr lang="en-US" sz="1600" dirty="0"/>
+              <a:t>SMOTE was the only preprocessing method that led to non-zero recall, i.e., at least one correct stroke classification.</a:t>
+            </a:r>
+          </a:p>
+          <a:p>
+            <a:pPr marL="285750" indent="-285750">
+              <a:buFont typeface="Arial" panose="020B0604020202020204" pitchFamily="34" charset="0"/>
+              <a:buChar char="•"/>
+            </a:pPr>
+            <a:r>
+              <a:rPr lang="en-US" sz="1600" dirty="0"/>
+              <a:t>Using F1 instead of accuracy had a </a:t>
+            </a:r>
+            <a:r>
+              <a:rPr lang="en-US" sz="1600" dirty="0">
+                <a:highlight>
+                  <a:srgbClr val="FFFF00"/>
+                </a:highlight>
+              </a:rPr>
+              <a:t>negligible</a:t>
+            </a:r>
+            <a:r>
+              <a:rPr lang="en-US" sz="1600" dirty="0"/>
+              <a:t> effect on evaluation metrics. </a:t>
+            </a:r>
+          </a:p>
+          <a:p>
+            <a:pPr marL="285750" indent="-285750">
+              <a:buFont typeface="Arial" panose="020B0604020202020204" pitchFamily="34" charset="0"/>
+              <a:buChar char="•"/>
+            </a:pPr>
+            <a:r>
+              <a:rPr lang="en-US" sz="1600" dirty="0"/>
+              <a:t>The final parameters from Bayesian optimization are </a:t>
+            </a:r>
+            <a:r>
+              <a:rPr lang="en-US" sz="1600" dirty="0">
+                <a:highlight>
+                  <a:srgbClr val="FFFF00"/>
+                </a:highlight>
+              </a:rPr>
+              <a:t>X</a:t>
+            </a:r>
+            <a:r>
+              <a:rPr lang="en-US" sz="1600" dirty="0"/>
+              <a:t> numbers of neighbors and </a:t>
+            </a:r>
+            <a:r>
+              <a:rPr lang="en-US" sz="1600" dirty="0">
+                <a:highlight>
+                  <a:srgbClr val="FFFF00"/>
+                </a:highlight>
+              </a:rPr>
+              <a:t>X</a:t>
+            </a:r>
+            <a:r>
+              <a:rPr lang="en-US" sz="1600" dirty="0"/>
+              <a:t> distance.</a:t>
+            </a:r>
+          </a:p>
+          <a:p>
+            <a:endParaRPr lang="en-US" sz="1600" dirty="0"/>
+          </a:p>
+        </p:txBody>
+      </p:sp>
+      <p:graphicFrame>
+        <p:nvGraphicFramePr>
+          <p:cNvPr id="47" name="Table 27">
+            <a:extLst>
+              <a:ext uri="{FF2B5EF4-FFF2-40B4-BE49-F238E27FC236}">
+                <a16:creationId xmlns:a16="http://schemas.microsoft.com/office/drawing/2014/main" id="{62C98E4E-10B2-478C-BE7C-3FCD74CCB53C}"/>
+              </a:ext>
+            </a:extLst>
+          </p:cNvPr>
+          <p:cNvGraphicFramePr>
+            <a:graphicFrameLocks noGrp="1"/>
+          </p:cNvGraphicFramePr>
+          <p:nvPr>
+            <p:extLst>
+              <p:ext uri="{D42A27DB-BD31-4B8C-83A1-F6EECF244321}">
+                <p14:modId xmlns:p14="http://schemas.microsoft.com/office/powerpoint/2010/main" val="2058733773"/>
+              </p:ext>
+            </p:extLst>
+          </p:nvPr>
+        </p:nvGraphicFramePr>
+        <p:xfrm>
+          <a:off x="245838" y="17578866"/>
+          <a:ext cx="1439287" cy="1813560"/>
+        </p:xfrm>
+        <a:graphic>
+          <a:graphicData uri="http://schemas.openxmlformats.org/drawingml/2006/table">
+            <a:tbl>
+              <a:tblPr firstRow="1" bandRow="1">
+                <a:tableStyleId>{9D7B26C5-4107-4FEC-AEDC-1716B250A1EF}</a:tableStyleId>
+              </a:tblPr>
+              <a:tblGrid>
+                <a:gridCol w="789570">
+                  <a:extLst>
+                    <a:ext uri="{9D8B030D-6E8A-4147-A177-3AD203B41FA5}">
+                      <a16:colId xmlns:a16="http://schemas.microsoft.com/office/drawing/2014/main" val="3467800109"/>
+                    </a:ext>
+                  </a:extLst>
+                </a:gridCol>
+                <a:gridCol w="649717">
+                  <a:extLst>
+                    <a:ext uri="{9D8B030D-6E8A-4147-A177-3AD203B41FA5}">
+                      <a16:colId xmlns:a16="http://schemas.microsoft.com/office/drawing/2014/main" val="2542221043"/>
+                    </a:ext>
+                  </a:extLst>
+                </a:gridCol>
+              </a:tblGrid>
+              <a:tr h="178772">
+                <a:tc>
+                  <a:txBody>
+                    <a:bodyPr/>
+                    <a:lstStyle/>
+                    <a:p>
+                      <a:r>
+                        <a:rPr lang="en-GB" sz="1100" dirty="0"/>
+                        <a:t>Metric</a:t>
+                      </a:r>
+                    </a:p>
+                  </a:txBody>
+                  <a:tcPr/>
+                </a:tc>
+                <a:tc>
+                  <a:txBody>
+                    <a:bodyPr/>
+                    <a:lstStyle/>
+                    <a:p>
+                      <a:r>
+                        <a:rPr lang="de-DE" sz="1100" dirty="0"/>
+                        <a:t>Score</a:t>
+                      </a:r>
+                      <a:endParaRPr lang="en-GB" sz="1100" dirty="0"/>
+                    </a:p>
+                  </a:txBody>
+                  <a:tcPr/>
+                </a:tc>
+                <a:extLst>
+                  <a:ext uri="{0D108BD9-81ED-4DB2-BD59-A6C34878D82A}">
+                    <a16:rowId xmlns:a16="http://schemas.microsoft.com/office/drawing/2014/main" val="1769268115"/>
+                  </a:ext>
+                </a:extLst>
+              </a:tr>
+              <a:tr h="200633">
+                <a:tc>
+                  <a:txBody>
+                    <a:bodyPr/>
+                    <a:lstStyle/>
+                    <a:p>
+                      <a:r>
+                        <a:rPr lang="de-DE" sz="1100" dirty="0" err="1"/>
+                        <a:t>Accuracy</a:t>
+                      </a:r>
+                      <a:endParaRPr lang="en-GB" sz="1100" dirty="0"/>
+                    </a:p>
+                  </a:txBody>
+                  <a:tcPr/>
+                </a:tc>
+                <a:tc>
+                  <a:txBody>
+                    <a:bodyPr/>
+                    <a:lstStyle/>
+                    <a:p>
+                      <a:endParaRPr lang="en-GB" sz="1100" dirty="0"/>
+                    </a:p>
+                  </a:txBody>
+                  <a:tcPr/>
+                </a:tc>
+                <a:extLst>
+                  <a:ext uri="{0D108BD9-81ED-4DB2-BD59-A6C34878D82A}">
+                    <a16:rowId xmlns:a16="http://schemas.microsoft.com/office/drawing/2014/main" val="1205327121"/>
+                  </a:ext>
+                </a:extLst>
+              </a:tr>
+              <a:tr h="200633">
+                <a:tc>
+                  <a:txBody>
+                    <a:bodyPr/>
+                    <a:lstStyle/>
+                    <a:p>
+                      <a:r>
+                        <a:rPr lang="de-DE" sz="1100" dirty="0"/>
+                        <a:t>Precision</a:t>
+                      </a:r>
+                      <a:endParaRPr lang="en-GB" sz="1100" dirty="0"/>
+                    </a:p>
+                  </a:txBody>
+                  <a:tcPr/>
+                </a:tc>
+                <a:tc>
+                  <a:txBody>
+                    <a:bodyPr/>
+                    <a:lstStyle/>
+                    <a:p>
+                      <a:pPr marL="0" marR="0" lvl="0" indent="0" algn="l" defTabSz="2138324" rtl="0" eaLnBrk="1" fontAlgn="auto" latinLnBrk="0" hangingPunct="1">
+                        <a:lnSpc>
+                          <a:spcPct val="100000"/>
+                        </a:lnSpc>
+                        <a:spcBef>
+                          <a:spcPts val="0"/>
+                        </a:spcBef>
+                        <a:spcAft>
+                          <a:spcPts val="0"/>
+                        </a:spcAft>
+                        <a:buClrTx/>
+                        <a:buSzTx/>
+                        <a:buFontTx/>
+                        <a:buNone/>
+                        <a:tabLst/>
+                        <a:defRPr/>
+                      </a:pPr>
+                      <a:endParaRPr lang="en-GB" sz="1100" dirty="0"/>
+                    </a:p>
+                  </a:txBody>
+                  <a:tcPr/>
+                </a:tc>
+                <a:extLst>
+                  <a:ext uri="{0D108BD9-81ED-4DB2-BD59-A6C34878D82A}">
+                    <a16:rowId xmlns:a16="http://schemas.microsoft.com/office/drawing/2014/main" val="333028761"/>
+                  </a:ext>
+                </a:extLst>
+              </a:tr>
+              <a:tr h="200633">
+                <a:tc>
+                  <a:txBody>
+                    <a:bodyPr/>
+                    <a:lstStyle/>
+                    <a:p>
+                      <a:r>
+                        <a:rPr lang="en-GB" sz="1100" dirty="0"/>
+                        <a:t>Recall</a:t>
+                      </a:r>
+                    </a:p>
+                  </a:txBody>
+                  <a:tcPr/>
+                </a:tc>
+                <a:tc>
+                  <a:txBody>
+                    <a:bodyPr/>
+                    <a:lstStyle/>
+                    <a:p>
+                      <a:pPr marL="0" marR="0" lvl="0" indent="0" algn="l" defTabSz="2138324" rtl="0" eaLnBrk="1" fontAlgn="auto" latinLnBrk="0" hangingPunct="1">
+                        <a:lnSpc>
+                          <a:spcPct val="100000"/>
+                        </a:lnSpc>
+                        <a:spcBef>
+                          <a:spcPts val="0"/>
+                        </a:spcBef>
+                        <a:spcAft>
+                          <a:spcPts val="0"/>
+                        </a:spcAft>
+                        <a:buClrTx/>
+                        <a:buSzTx/>
+                        <a:buFontTx/>
+                        <a:buNone/>
+                        <a:tabLst/>
+                        <a:defRPr/>
+                      </a:pPr>
+                      <a:endParaRPr lang="en-GB" sz="1100" dirty="0"/>
+                    </a:p>
+                  </a:txBody>
+                  <a:tcPr/>
+                </a:tc>
+                <a:extLst>
+                  <a:ext uri="{0D108BD9-81ED-4DB2-BD59-A6C34878D82A}">
+                    <a16:rowId xmlns:a16="http://schemas.microsoft.com/office/drawing/2014/main" val="2712605215"/>
+                  </a:ext>
+                </a:extLst>
+              </a:tr>
+              <a:tr h="200633">
+                <a:tc>
+                  <a:txBody>
+                    <a:bodyPr/>
+                    <a:lstStyle/>
+                    <a:p>
+                      <a:r>
+                        <a:rPr lang="de-DE" sz="1100" dirty="0" err="1"/>
+                        <a:t>Specificity</a:t>
+                      </a:r>
+                      <a:endParaRPr lang="en-GB" sz="1100" dirty="0"/>
+                    </a:p>
+                  </a:txBody>
+                  <a:tcPr/>
+                </a:tc>
+                <a:tc>
+                  <a:txBody>
+                    <a:bodyPr/>
+                    <a:lstStyle/>
+                    <a:p>
+                      <a:pPr marL="0" marR="0" lvl="0" indent="0" algn="l" defTabSz="2138324" rtl="0" eaLnBrk="1" fontAlgn="auto" latinLnBrk="0" hangingPunct="1">
+                        <a:lnSpc>
+                          <a:spcPct val="100000"/>
+                        </a:lnSpc>
+                        <a:spcBef>
+                          <a:spcPts val="0"/>
+                        </a:spcBef>
+                        <a:spcAft>
+                          <a:spcPts val="0"/>
+                        </a:spcAft>
+                        <a:buClrTx/>
+                        <a:buSzTx/>
+                        <a:buFontTx/>
+                        <a:buNone/>
+                        <a:tabLst/>
+                        <a:defRPr/>
+                      </a:pPr>
+                      <a:endParaRPr lang="en-GB" sz="1100" dirty="0"/>
+                    </a:p>
+                  </a:txBody>
+                  <a:tcPr/>
+                </a:tc>
+                <a:extLst>
+                  <a:ext uri="{0D108BD9-81ED-4DB2-BD59-A6C34878D82A}">
+                    <a16:rowId xmlns:a16="http://schemas.microsoft.com/office/drawing/2014/main" val="1107554220"/>
+                  </a:ext>
+                </a:extLst>
+              </a:tr>
+              <a:tr h="200633">
+                <a:tc>
+                  <a:txBody>
+                    <a:bodyPr/>
+                    <a:lstStyle/>
+                    <a:p>
+                      <a:r>
+                        <a:rPr lang="de-DE" sz="1100" dirty="0"/>
+                        <a:t>F1-Score</a:t>
+                      </a:r>
+                      <a:endParaRPr lang="en-GB" sz="1100" dirty="0"/>
+                    </a:p>
+                  </a:txBody>
+                  <a:tcPr/>
+                </a:tc>
+                <a:tc>
+                  <a:txBody>
+                    <a:bodyPr/>
+                    <a:lstStyle/>
+                    <a:p>
+                      <a:pPr marL="0" marR="0" lvl="0" indent="0" algn="l" defTabSz="2138324" rtl="0" eaLnBrk="1" fontAlgn="auto" latinLnBrk="0" hangingPunct="1">
+                        <a:lnSpc>
+                          <a:spcPct val="100000"/>
+                        </a:lnSpc>
+                        <a:spcBef>
+                          <a:spcPts val="0"/>
+                        </a:spcBef>
+                        <a:spcAft>
+                          <a:spcPts val="0"/>
+                        </a:spcAft>
+                        <a:buClrTx/>
+                        <a:buSzTx/>
+                        <a:buFontTx/>
+                        <a:buNone/>
+                        <a:tabLst/>
+                        <a:defRPr/>
+                      </a:pPr>
+                      <a:endParaRPr lang="en-GB" sz="1100" dirty="0"/>
+                    </a:p>
+                  </a:txBody>
+                  <a:tcPr/>
+                </a:tc>
+                <a:extLst>
+                  <a:ext uri="{0D108BD9-81ED-4DB2-BD59-A6C34878D82A}">
+                    <a16:rowId xmlns:a16="http://schemas.microsoft.com/office/drawing/2014/main" val="2574062035"/>
+                  </a:ext>
+                </a:extLst>
+              </a:tr>
+              <a:tr h="200633">
+                <a:tc>
+                  <a:txBody>
+                    <a:bodyPr/>
+                    <a:lstStyle/>
+                    <a:p>
+                      <a:r>
+                        <a:rPr lang="en-GB" sz="1100" dirty="0"/>
+                        <a:t>Runtime</a:t>
+                      </a:r>
+                    </a:p>
+                  </a:txBody>
+                  <a:tcPr/>
+                </a:tc>
+                <a:tc>
+                  <a:txBody>
+                    <a:bodyPr/>
+                    <a:lstStyle/>
+                    <a:p>
+                      <a:pPr marL="0" marR="0" lvl="0" indent="0" algn="l" defTabSz="2138324" rtl="0" eaLnBrk="1" fontAlgn="auto" latinLnBrk="0" hangingPunct="1">
+                        <a:lnSpc>
+                          <a:spcPct val="100000"/>
+                        </a:lnSpc>
+                        <a:spcBef>
+                          <a:spcPts val="0"/>
+                        </a:spcBef>
+                        <a:spcAft>
+                          <a:spcPts val="0"/>
+                        </a:spcAft>
+                        <a:buClrTx/>
+                        <a:buSzTx/>
+                        <a:buFontTx/>
+                        <a:buNone/>
+                        <a:tabLst/>
+                        <a:defRPr/>
+                      </a:pPr>
+                      <a:endParaRPr lang="en-GB" sz="1100" dirty="0"/>
+                    </a:p>
+                  </a:txBody>
+                  <a:tcPr/>
+                </a:tc>
+                <a:extLst>
+                  <a:ext uri="{0D108BD9-81ED-4DB2-BD59-A6C34878D82A}">
+                    <a16:rowId xmlns:a16="http://schemas.microsoft.com/office/drawing/2014/main" val="1155970600"/>
+                  </a:ext>
+                </a:extLst>
+              </a:tr>
+            </a:tbl>
+          </a:graphicData>
+        </a:graphic>
+      </p:graphicFrame>
+      <p:graphicFrame>
+        <p:nvGraphicFramePr>
+          <p:cNvPr id="48" name="Table 27">
+            <a:extLst>
+              <a:ext uri="{FF2B5EF4-FFF2-40B4-BE49-F238E27FC236}">
+                <a16:creationId xmlns:a16="http://schemas.microsoft.com/office/drawing/2014/main" id="{BA25BDC9-95AA-4F84-8E6F-8A6163BA1D61}"/>
+              </a:ext>
+            </a:extLst>
+          </p:cNvPr>
+          <p:cNvGraphicFramePr>
+            <a:graphicFrameLocks noGrp="1"/>
+          </p:cNvGraphicFramePr>
+          <p:nvPr>
+            <p:extLst>
+              <p:ext uri="{D42A27DB-BD31-4B8C-83A1-F6EECF244321}">
+                <p14:modId xmlns:p14="http://schemas.microsoft.com/office/powerpoint/2010/main" val="3779076729"/>
+              </p:ext>
+            </p:extLst>
+          </p:nvPr>
+        </p:nvGraphicFramePr>
+        <p:xfrm>
+          <a:off x="10762213" y="17578866"/>
+          <a:ext cx="1439287" cy="1813560"/>
+        </p:xfrm>
+        <a:graphic>
+          <a:graphicData uri="http://schemas.openxmlformats.org/drawingml/2006/table">
+            <a:tbl>
+              <a:tblPr firstRow="1" bandRow="1">
+                <a:tableStyleId>{9D7B26C5-4107-4FEC-AEDC-1716B250A1EF}</a:tableStyleId>
+              </a:tblPr>
+              <a:tblGrid>
+                <a:gridCol w="789570">
+                  <a:extLst>
+                    <a:ext uri="{9D8B030D-6E8A-4147-A177-3AD203B41FA5}">
+                      <a16:colId xmlns:a16="http://schemas.microsoft.com/office/drawing/2014/main" val="3467800109"/>
+                    </a:ext>
+                  </a:extLst>
+                </a:gridCol>
+                <a:gridCol w="649717">
+                  <a:extLst>
+                    <a:ext uri="{9D8B030D-6E8A-4147-A177-3AD203B41FA5}">
+                      <a16:colId xmlns:a16="http://schemas.microsoft.com/office/drawing/2014/main" val="2542221043"/>
+                    </a:ext>
+                  </a:extLst>
+                </a:gridCol>
+              </a:tblGrid>
+              <a:tr h="178772">
+                <a:tc>
+                  <a:txBody>
+                    <a:bodyPr/>
+                    <a:lstStyle/>
+                    <a:p>
+                      <a:r>
+                        <a:rPr lang="en-GB" sz="1100" dirty="0"/>
+                        <a:t>Metric</a:t>
+                      </a:r>
+                    </a:p>
+                  </a:txBody>
+                  <a:tcPr/>
+                </a:tc>
+                <a:tc>
+                  <a:txBody>
+                    <a:bodyPr/>
+                    <a:lstStyle/>
+                    <a:p>
+                      <a:r>
+                        <a:rPr lang="de-DE" sz="1100" dirty="0"/>
+                        <a:t>Score</a:t>
+                      </a:r>
+                      <a:endParaRPr lang="en-GB" sz="1100" dirty="0"/>
+                    </a:p>
+                  </a:txBody>
+                  <a:tcPr/>
+                </a:tc>
+                <a:extLst>
+                  <a:ext uri="{0D108BD9-81ED-4DB2-BD59-A6C34878D82A}">
+                    <a16:rowId xmlns:a16="http://schemas.microsoft.com/office/drawing/2014/main" val="1769268115"/>
+                  </a:ext>
+                </a:extLst>
+              </a:tr>
+              <a:tr h="200633">
+                <a:tc>
+                  <a:txBody>
+                    <a:bodyPr/>
+                    <a:lstStyle/>
+                    <a:p>
+                      <a:r>
+                        <a:rPr lang="de-DE" sz="1100" dirty="0" err="1"/>
+                        <a:t>Accuracy</a:t>
+                      </a:r>
+                      <a:endParaRPr lang="en-GB" sz="1100" dirty="0"/>
+                    </a:p>
+                  </a:txBody>
+                  <a:tcPr/>
+                </a:tc>
+                <a:tc>
+                  <a:txBody>
+                    <a:bodyPr/>
+                    <a:lstStyle/>
+                    <a:p>
+                      <a:endParaRPr lang="en-GB" sz="1100" dirty="0"/>
+                    </a:p>
+                  </a:txBody>
+                  <a:tcPr/>
+                </a:tc>
+                <a:extLst>
+                  <a:ext uri="{0D108BD9-81ED-4DB2-BD59-A6C34878D82A}">
+                    <a16:rowId xmlns:a16="http://schemas.microsoft.com/office/drawing/2014/main" val="1205327121"/>
+                  </a:ext>
+                </a:extLst>
+              </a:tr>
+              <a:tr h="200633">
+                <a:tc>
+                  <a:txBody>
+                    <a:bodyPr/>
+                    <a:lstStyle/>
+                    <a:p>
+                      <a:r>
+                        <a:rPr lang="de-DE" sz="1100" dirty="0"/>
+                        <a:t>Precision</a:t>
+                      </a:r>
+                      <a:endParaRPr lang="en-GB" sz="1100" dirty="0"/>
+                    </a:p>
+                  </a:txBody>
+                  <a:tcPr/>
+                </a:tc>
+                <a:tc>
+                  <a:txBody>
+                    <a:bodyPr/>
+                    <a:lstStyle/>
+                    <a:p>
+                      <a:pPr marL="0" marR="0" lvl="0" indent="0" algn="l" defTabSz="2138324" rtl="0" eaLnBrk="1" fontAlgn="auto" latinLnBrk="0" hangingPunct="1">
+                        <a:lnSpc>
+                          <a:spcPct val="100000"/>
+                        </a:lnSpc>
+                        <a:spcBef>
+                          <a:spcPts val="0"/>
+                        </a:spcBef>
+                        <a:spcAft>
+                          <a:spcPts val="0"/>
+                        </a:spcAft>
+                        <a:buClrTx/>
+                        <a:buSzTx/>
+                        <a:buFontTx/>
+                        <a:buNone/>
+                        <a:tabLst/>
+                        <a:defRPr/>
+                      </a:pPr>
+                      <a:endParaRPr lang="en-GB" sz="1100" dirty="0"/>
+                    </a:p>
+                  </a:txBody>
+                  <a:tcPr/>
+                </a:tc>
+                <a:extLst>
+                  <a:ext uri="{0D108BD9-81ED-4DB2-BD59-A6C34878D82A}">
+                    <a16:rowId xmlns:a16="http://schemas.microsoft.com/office/drawing/2014/main" val="333028761"/>
+                  </a:ext>
+                </a:extLst>
+              </a:tr>
+              <a:tr h="200633">
+                <a:tc>
+                  <a:txBody>
+                    <a:bodyPr/>
+                    <a:lstStyle/>
+                    <a:p>
+                      <a:r>
+                        <a:rPr lang="en-GB" sz="1100" dirty="0"/>
+                        <a:t>Recall</a:t>
+                      </a:r>
+                    </a:p>
+                  </a:txBody>
+                  <a:tcPr/>
+                </a:tc>
+                <a:tc>
+                  <a:txBody>
+                    <a:bodyPr/>
+                    <a:lstStyle/>
+                    <a:p>
+                      <a:pPr marL="0" marR="0" lvl="0" indent="0" algn="l" defTabSz="2138324" rtl="0" eaLnBrk="1" fontAlgn="auto" latinLnBrk="0" hangingPunct="1">
+                        <a:lnSpc>
+                          <a:spcPct val="100000"/>
+                        </a:lnSpc>
+                        <a:spcBef>
+                          <a:spcPts val="0"/>
+                        </a:spcBef>
+                        <a:spcAft>
+                          <a:spcPts val="0"/>
+                        </a:spcAft>
+                        <a:buClrTx/>
+                        <a:buSzTx/>
+                        <a:buFontTx/>
+                        <a:buNone/>
+                        <a:tabLst/>
+                        <a:defRPr/>
+                      </a:pPr>
+                      <a:endParaRPr lang="en-GB" sz="1100" dirty="0"/>
+                    </a:p>
+                  </a:txBody>
+                  <a:tcPr/>
+                </a:tc>
+                <a:extLst>
+                  <a:ext uri="{0D108BD9-81ED-4DB2-BD59-A6C34878D82A}">
+                    <a16:rowId xmlns:a16="http://schemas.microsoft.com/office/drawing/2014/main" val="2712605215"/>
+                  </a:ext>
+                </a:extLst>
+              </a:tr>
+              <a:tr h="200633">
+                <a:tc>
+                  <a:txBody>
+                    <a:bodyPr/>
+                    <a:lstStyle/>
+                    <a:p>
+                      <a:r>
+                        <a:rPr lang="de-DE" sz="1100" dirty="0" err="1"/>
+                        <a:t>Specificity</a:t>
+                      </a:r>
+                      <a:endParaRPr lang="en-GB" sz="1100" dirty="0"/>
+                    </a:p>
+                  </a:txBody>
+                  <a:tcPr/>
+                </a:tc>
+                <a:tc>
+                  <a:txBody>
+                    <a:bodyPr/>
+                    <a:lstStyle/>
+                    <a:p>
+                      <a:pPr marL="0" marR="0" lvl="0" indent="0" algn="l" defTabSz="2138324" rtl="0" eaLnBrk="1" fontAlgn="auto" latinLnBrk="0" hangingPunct="1">
+                        <a:lnSpc>
+                          <a:spcPct val="100000"/>
+                        </a:lnSpc>
+                        <a:spcBef>
+                          <a:spcPts val="0"/>
+                        </a:spcBef>
+                        <a:spcAft>
+                          <a:spcPts val="0"/>
+                        </a:spcAft>
+                        <a:buClrTx/>
+                        <a:buSzTx/>
+                        <a:buFontTx/>
+                        <a:buNone/>
+                        <a:tabLst/>
+                        <a:defRPr/>
+                      </a:pPr>
+                      <a:endParaRPr lang="en-GB" sz="1100" dirty="0"/>
+                    </a:p>
+                  </a:txBody>
+                  <a:tcPr/>
+                </a:tc>
+                <a:extLst>
+                  <a:ext uri="{0D108BD9-81ED-4DB2-BD59-A6C34878D82A}">
+                    <a16:rowId xmlns:a16="http://schemas.microsoft.com/office/drawing/2014/main" val="1107554220"/>
+                  </a:ext>
+                </a:extLst>
+              </a:tr>
+              <a:tr h="200633">
+                <a:tc>
+                  <a:txBody>
+                    <a:bodyPr/>
+                    <a:lstStyle/>
+                    <a:p>
+                      <a:r>
+                        <a:rPr lang="de-DE" sz="1100" dirty="0"/>
+                        <a:t>F1-Score</a:t>
+                      </a:r>
+                      <a:endParaRPr lang="en-GB" sz="1100" dirty="0"/>
+                    </a:p>
+                  </a:txBody>
+                  <a:tcPr/>
+                </a:tc>
+                <a:tc>
+                  <a:txBody>
+                    <a:bodyPr/>
+                    <a:lstStyle/>
+                    <a:p>
+                      <a:pPr marL="0" marR="0" lvl="0" indent="0" algn="l" defTabSz="2138324" rtl="0" eaLnBrk="1" fontAlgn="auto" latinLnBrk="0" hangingPunct="1">
+                        <a:lnSpc>
+                          <a:spcPct val="100000"/>
+                        </a:lnSpc>
+                        <a:spcBef>
+                          <a:spcPts val="0"/>
+                        </a:spcBef>
+                        <a:spcAft>
+                          <a:spcPts val="0"/>
+                        </a:spcAft>
+                        <a:buClrTx/>
+                        <a:buSzTx/>
+                        <a:buFontTx/>
+                        <a:buNone/>
+                        <a:tabLst/>
+                        <a:defRPr/>
+                      </a:pPr>
+                      <a:endParaRPr lang="en-GB" sz="1100" dirty="0"/>
+                    </a:p>
+                  </a:txBody>
+                  <a:tcPr/>
+                </a:tc>
+                <a:extLst>
+                  <a:ext uri="{0D108BD9-81ED-4DB2-BD59-A6C34878D82A}">
+                    <a16:rowId xmlns:a16="http://schemas.microsoft.com/office/drawing/2014/main" val="2574062035"/>
+                  </a:ext>
+                </a:extLst>
+              </a:tr>
+              <a:tr h="200633">
+                <a:tc>
+                  <a:txBody>
+                    <a:bodyPr/>
+                    <a:lstStyle/>
+                    <a:p>
+                      <a:r>
+                        <a:rPr lang="en-GB" sz="1100" dirty="0"/>
+                        <a:t>Runtime</a:t>
+                      </a:r>
+                    </a:p>
+                  </a:txBody>
+                  <a:tcPr/>
+                </a:tc>
+                <a:tc>
+                  <a:txBody>
+                    <a:bodyPr/>
+                    <a:lstStyle/>
+                    <a:p>
+                      <a:pPr marL="0" marR="0" lvl="0" indent="0" algn="l" defTabSz="2138324" rtl="0" eaLnBrk="1" fontAlgn="auto" latinLnBrk="0" hangingPunct="1">
+                        <a:lnSpc>
+                          <a:spcPct val="100000"/>
+                        </a:lnSpc>
+                        <a:spcBef>
+                          <a:spcPts val="0"/>
+                        </a:spcBef>
+                        <a:spcAft>
+                          <a:spcPts val="0"/>
+                        </a:spcAft>
+                        <a:buClrTx/>
+                        <a:buSzTx/>
+                        <a:buFontTx/>
+                        <a:buNone/>
+                        <a:tabLst/>
+                        <a:defRPr/>
+                      </a:pPr>
+                      <a:endParaRPr lang="en-GB" sz="1100" dirty="0"/>
+                    </a:p>
+                  </a:txBody>
+                  <a:tcPr/>
+                </a:tc>
+                <a:extLst>
+                  <a:ext uri="{0D108BD9-81ED-4DB2-BD59-A6C34878D82A}">
+                    <a16:rowId xmlns:a16="http://schemas.microsoft.com/office/drawing/2014/main" val="1155970600"/>
+                  </a:ext>
+                </a:extLst>
+              </a:tr>
+            </a:tbl>
+          </a:graphicData>
+        </a:graphic>
+      </p:graphicFrame>
     </p:spTree>
     <p:extLst>
       <p:ext uri="{BB962C8B-B14F-4D97-AF65-F5344CB8AC3E}">

</xml_diff>